<commit_message>
Adding first few quizzes and one extra hw
</commit_message>
<xml_diff>
--- a/slides/graphs-advanced.pptx
+++ b/slides/graphs-advanced.pptx
@@ -6051,7 +6051,7 @@
           <a:noFill/>
           <a:extLst>
             <a:ext uri="{909E8E84-426E-40dd-AFC4-6F175D3DCCD1}">
-              <a14:hiddenFill xmlns:a14="http://schemas.microsoft.com/office/drawing/2010/main" xmlns="">
+              <a14:hiddenFill xmlns="" xmlns:a14="http://schemas.microsoft.com/office/drawing/2010/main">
                 <a:solidFill>
                   <a:srgbClr val="FFFFFF"/>
                 </a:solidFill>
@@ -6212,7 +6212,7 @@
           <a:noFill/>
           <a:extLst>
             <a:ext uri="{909E8E84-426E-40dd-AFC4-6F175D3DCCD1}">
-              <a14:hiddenFill xmlns:a14="http://schemas.microsoft.com/office/drawing/2010/main" xmlns="">
+              <a14:hiddenFill xmlns="" xmlns:a14="http://schemas.microsoft.com/office/drawing/2010/main">
                 <a:solidFill>
                   <a:srgbClr val="FFFFFF"/>
                 </a:solidFill>

</xml_diff>